<commit_message>
Materiały GitLab w rozwoju oprogramowania i zmiany w prezentacjach
</commit_message>
<xml_diff>
--- a/08. Git - tutorial - Issue Board.pptx
+++ b/08. Git - tutorial - Issue Board.pptx
@@ -5,7 +5,7 @@
     <p:sldMasterId id="2147483648" r:id="rId1"/>
   </p:sldMasterIdLst>
   <p:notesMasterIdLst>
-    <p:notesMasterId r:id="rId19"/>
+    <p:notesMasterId r:id="rId18"/>
   </p:notesMasterIdLst>
   <p:sldIdLst>
     <p:sldId id="310" r:id="rId2"/>
@@ -19,12 +19,11 @@
     <p:sldId id="317" r:id="rId10"/>
     <p:sldId id="318" r:id="rId11"/>
     <p:sldId id="321" r:id="rId12"/>
-    <p:sldId id="322" r:id="rId13"/>
-    <p:sldId id="323" r:id="rId14"/>
-    <p:sldId id="324" r:id="rId15"/>
-    <p:sldId id="325" r:id="rId16"/>
-    <p:sldId id="326" r:id="rId17"/>
-    <p:sldId id="319" r:id="rId18"/>
+    <p:sldId id="323" r:id="rId13"/>
+    <p:sldId id="324" r:id="rId14"/>
+    <p:sldId id="325" r:id="rId15"/>
+    <p:sldId id="326" r:id="rId16"/>
+    <p:sldId id="319" r:id="rId17"/>
   </p:sldIdLst>
   <p:sldSz cx="9144000" cy="5143500" type="screen16x9"/>
   <p:notesSz cx="6858000" cy="9144000"/>
@@ -125,7 +124,7 @@
   </p:defaultTextStyle>
   <p:extLst>
     <p:ext uri="{EFAFB233-063F-42B5-8137-9DF3F51BA10A}">
-      <p15:sldGuideLst xmlns:p15="http://schemas.microsoft.com/office/powerpoint/2012/main">
+      <p15:sldGuideLst xmlns:p15="http://schemas.microsoft.com/office/powerpoint/2012/main" xmlns="">
         <p15:guide id="1" orient="horz" pos="1620">
           <p15:clr>
             <a:srgbClr val="A4A3A4"/>
@@ -224,7 +223,7 @@
           <a:p>
             <a:fld id="{F4CC630C-9AF6-49E5-9919-D038F5C57BFC}" type="datetimeFigureOut">
               <a:rPr lang="en-US" smtClean="0"/>
-              <a:t>4/28/2021</a:t>
+              <a:t>5/5/2021</a:t>
             </a:fld>
             <a:endParaRPr lang="en-US"/>
           </a:p>
@@ -673,7 +672,7 @@
           <a:p>
             <a:fld id="{F19922E3-32CA-40BB-949D-A04DA951D7AE}" type="datetimeFigureOut">
               <a:rPr lang="en-US" smtClean="0"/>
-              <a:t>4/28/2021</a:t>
+              <a:t>5/5/2021</a:t>
             </a:fld>
             <a:endParaRPr lang="en-US"/>
           </a:p>
@@ -843,7 +842,7 @@
           <a:p>
             <a:fld id="{F19922E3-32CA-40BB-949D-A04DA951D7AE}" type="datetimeFigureOut">
               <a:rPr lang="en-US" smtClean="0"/>
-              <a:t>4/28/2021</a:t>
+              <a:t>5/5/2021</a:t>
             </a:fld>
             <a:endParaRPr lang="en-US"/>
           </a:p>
@@ -1023,7 +1022,7 @@
           <a:p>
             <a:fld id="{F19922E3-32CA-40BB-949D-A04DA951D7AE}" type="datetimeFigureOut">
               <a:rPr lang="en-US" smtClean="0"/>
-              <a:t>4/28/2021</a:t>
+              <a:t>5/5/2021</a:t>
             </a:fld>
             <a:endParaRPr lang="en-US"/>
           </a:p>
@@ -1193,7 +1192,7 @@
           <a:p>
             <a:fld id="{F19922E3-32CA-40BB-949D-A04DA951D7AE}" type="datetimeFigureOut">
               <a:rPr lang="en-US" smtClean="0"/>
-              <a:t>4/28/2021</a:t>
+              <a:t>5/5/2021</a:t>
             </a:fld>
             <a:endParaRPr lang="en-US"/>
           </a:p>
@@ -1439,7 +1438,7 @@
           <a:p>
             <a:fld id="{F19922E3-32CA-40BB-949D-A04DA951D7AE}" type="datetimeFigureOut">
               <a:rPr lang="en-US" smtClean="0"/>
-              <a:t>4/28/2021</a:t>
+              <a:t>5/5/2021</a:t>
             </a:fld>
             <a:endParaRPr lang="en-US"/>
           </a:p>
@@ -1727,7 +1726,7 @@
           <a:p>
             <a:fld id="{F19922E3-32CA-40BB-949D-A04DA951D7AE}" type="datetimeFigureOut">
               <a:rPr lang="en-US" smtClean="0"/>
-              <a:t>4/28/2021</a:t>
+              <a:t>5/5/2021</a:t>
             </a:fld>
             <a:endParaRPr lang="en-US"/>
           </a:p>
@@ -2154,7 +2153,7 @@
           <a:p>
             <a:fld id="{F19922E3-32CA-40BB-949D-A04DA951D7AE}" type="datetimeFigureOut">
               <a:rPr lang="en-US" smtClean="0"/>
-              <a:t>4/28/2021</a:t>
+              <a:t>5/5/2021</a:t>
             </a:fld>
             <a:endParaRPr lang="en-US"/>
           </a:p>
@@ -2272,7 +2271,7 @@
           <a:p>
             <a:fld id="{F19922E3-32CA-40BB-949D-A04DA951D7AE}" type="datetimeFigureOut">
               <a:rPr lang="en-US" smtClean="0"/>
-              <a:t>4/28/2021</a:t>
+              <a:t>5/5/2021</a:t>
             </a:fld>
             <a:endParaRPr lang="en-US"/>
           </a:p>
@@ -2367,7 +2366,7 @@
           <a:p>
             <a:fld id="{F19922E3-32CA-40BB-949D-A04DA951D7AE}" type="datetimeFigureOut">
               <a:rPr lang="en-US" smtClean="0"/>
-              <a:t>4/28/2021</a:t>
+              <a:t>5/5/2021</a:t>
             </a:fld>
             <a:endParaRPr lang="en-US"/>
           </a:p>
@@ -2644,7 +2643,7 @@
           <a:p>
             <a:fld id="{F19922E3-32CA-40BB-949D-A04DA951D7AE}" type="datetimeFigureOut">
               <a:rPr lang="en-US" smtClean="0"/>
-              <a:t>4/28/2021</a:t>
+              <a:t>5/5/2021</a:t>
             </a:fld>
             <a:endParaRPr lang="en-US"/>
           </a:p>
@@ -2897,7 +2896,7 @@
           <a:p>
             <a:fld id="{F19922E3-32CA-40BB-949D-A04DA951D7AE}" type="datetimeFigureOut">
               <a:rPr lang="en-US" smtClean="0"/>
-              <a:t>4/28/2021</a:t>
+              <a:t>5/5/2021</a:t>
             </a:fld>
             <a:endParaRPr lang="en-US"/>
           </a:p>
@@ -3119,7 +3118,7 @@
           <a:p>
             <a:fld id="{F19922E3-32CA-40BB-949D-A04DA951D7AE}" type="datetimeFigureOut">
               <a:rPr lang="en-US" smtClean="0"/>
-              <a:t>4/28/2021</a:t>
+              <a:t>5/5/2021</a:t>
             </a:fld>
             <a:endParaRPr lang="en-US"/>
           </a:p>
@@ -3538,32 +3537,46 @@
               <a:t>GitLab </a:t>
             </a:r>
             <a:r>
-              <a:rPr lang="pl-PL" sz="1800" i="1" dirty="0" err="1" smtClean="0">
+              <a:rPr lang="en-US" sz="1800" i="1" dirty="0" smtClean="0">
                 <a:latin typeface="Verdana" panose="020B0604030504040204" pitchFamily="34" charset="0"/>
                 <a:ea typeface="Verdana" panose="020B0604030504040204" pitchFamily="34" charset="0"/>
               </a:rPr>
-              <a:t>Issue</a:t>
+              <a:t>Issue Bo</a:t>
             </a:r>
             <a:r>
               <a:rPr lang="pl-PL" sz="1800" i="1" dirty="0" smtClean="0">
                 <a:latin typeface="Verdana" panose="020B0604030504040204" pitchFamily="34" charset="0"/>
                 <a:ea typeface="Verdana" panose="020B0604030504040204" pitchFamily="34" charset="0"/>
               </a:rPr>
-              <a:t> </a:t>
-            </a:r>
-            <a:r>
-              <a:rPr lang="pl-PL" sz="1800" i="1" dirty="0" err="1" smtClean="0">
+              <a:t>a</a:t>
+            </a:r>
+            <a:r>
+              <a:rPr lang="en-US" sz="1800" i="1" dirty="0" err="1" smtClean="0">
                 <a:latin typeface="Verdana" panose="020B0604030504040204" pitchFamily="34" charset="0"/>
                 <a:ea typeface="Verdana" panose="020B0604030504040204" pitchFamily="34" charset="0"/>
               </a:rPr>
-              <a:t>Bord</a:t>
+              <a:t>rd</a:t>
+            </a:r>
+            <a:r>
+              <a:rPr lang="en-US" sz="1800" i="1" dirty="0" smtClean="0">
+                <a:latin typeface="Verdana" panose="020B0604030504040204" pitchFamily="34" charset="0"/>
+                <a:ea typeface="Verdana" panose="020B0604030504040204" pitchFamily="34" charset="0"/>
+              </a:rPr>
+              <a:t> </a:t>
             </a:r>
             <a:r>
               <a:rPr lang="pl-PL" sz="1800" i="1" dirty="0" smtClean="0">
                 <a:latin typeface="Verdana" panose="020B0604030504040204" pitchFamily="34" charset="0"/>
                 <a:ea typeface="Verdana" panose="020B0604030504040204" pitchFamily="34" charset="0"/>
               </a:rPr>
-              <a:t> (tablica zgłoszeń/zadań)</a:t>
+              <a:t>(</a:t>
+            </a:r>
+            <a:r>
+              <a:rPr lang="pl-PL" sz="1800" i="1" dirty="0" smtClean="0">
+                <a:latin typeface="Verdana" panose="020B0604030504040204" pitchFamily="34" charset="0"/>
+                <a:ea typeface="Verdana" panose="020B0604030504040204" pitchFamily="34" charset="0"/>
+              </a:rPr>
+              <a:t>tablica zgłoszeń/zadań)</a:t>
             </a:r>
             <a:endParaRPr lang="en-US" sz="1800" i="1" dirty="0">
               <a:latin typeface="Verdana" panose="020B0604030504040204" pitchFamily="34" charset="0"/>
@@ -3664,12 +3677,8 @@
               <a:buNone/>
             </a:pPr>
             <a:r>
-              <a:rPr lang="pl-PL" sz="2400" b="1" dirty="0" err="1"/>
-              <a:t>Issue</a:t>
-            </a:r>
-            <a:r>
               <a:rPr lang="pl-PL" sz="2400" b="1" dirty="0"/>
-              <a:t> Board</a:t>
+              <a:t>Issue Board</a:t>
             </a:r>
             <a:endParaRPr lang="pl-PL" sz="1600" b="1" dirty="0"/>
           </a:p>
@@ -3699,15 +3708,7 @@
             </a:r>
             <a:r>
               <a:rPr lang="pl-PL" sz="2000" dirty="0"/>
-              <a:t> </a:t>
-            </a:r>
-            <a:r>
-              <a:rPr lang="pl-PL" sz="2000" dirty="0" err="1"/>
-              <a:t>Issue</a:t>
-            </a:r>
-            <a:r>
-              <a:rPr lang="pl-PL" sz="2000" dirty="0"/>
-              <a:t> </a:t>
+              <a:t> Issue </a:t>
             </a:r>
             <a:r>
               <a:rPr lang="pl-PL" sz="2000" dirty="0" err="1"/>
@@ -3723,15 +3724,7 @@
             </a:r>
             <a:r>
               <a:rPr lang="pl-PL" sz="2000" dirty="0"/>
-              <a:t> </a:t>
-            </a:r>
-            <a:r>
-              <a:rPr lang="pl-PL" sz="2000" dirty="0" err="1"/>
-              <a:t>Issue</a:t>
-            </a:r>
-            <a:r>
-              <a:rPr lang="pl-PL" sz="2000" dirty="0"/>
-              <a:t> </a:t>
+              <a:t> Issue </a:t>
             </a:r>
             <a:r>
               <a:rPr lang="pl-PL" sz="2000" dirty="0" err="1"/>
@@ -3816,12 +3809,8 @@
               <a:buNone/>
             </a:pPr>
             <a:r>
-              <a:rPr lang="pl-PL" sz="2400" b="1" dirty="0" err="1" smtClean="0"/>
-              <a:t>Issue</a:t>
-            </a:r>
-            <a:r>
               <a:rPr lang="pl-PL" sz="2400" b="1" dirty="0" smtClean="0"/>
-              <a:t> Board w praktyce</a:t>
+              <a:t>Issue Board w praktyce</a:t>
             </a:r>
             <a:endParaRPr lang="pl-PL" sz="1600" b="1" dirty="0"/>
           </a:p>
@@ -3967,7 +3956,7 @@
         </p:spPr>
         <p:txBody>
           <a:bodyPr>
-            <a:normAutofit lnSpcReduction="10000"/>
+            <a:normAutofit/>
           </a:bodyPr>
           <a:lstStyle/>
           <a:p>
@@ -3975,12 +3964,8 @@
               <a:buNone/>
             </a:pPr>
             <a:r>
-              <a:rPr lang="pl-PL" sz="2400" b="1" dirty="0" err="1" smtClean="0"/>
-              <a:t>Issue</a:t>
-            </a:r>
-            <a:r>
               <a:rPr lang="pl-PL" sz="2400" b="1" dirty="0" smtClean="0"/>
-              <a:t> Board w praktyce</a:t>
+              <a:t>Issue Board w praktyce</a:t>
             </a:r>
             <a:endParaRPr lang="pl-PL" sz="1600" b="1" dirty="0"/>
           </a:p>
@@ -3995,7 +3980,15 @@
           <a:p>
             <a:r>
               <a:rPr lang="pl-PL" sz="2000" dirty="0" smtClean="0"/>
-              <a:t>Jedno narzędzie / nieskończona funkcjonalność</a:t>
+              <a:t>Więcej </a:t>
+            </a:r>
+            <a:r>
+              <a:rPr lang="pl-PL" sz="2000" dirty="0"/>
+              <a:t>niż wizualna </a:t>
+            </a:r>
+            <a:r>
+              <a:rPr lang="pl-PL" sz="2000" dirty="0" smtClean="0"/>
+              <a:t>reprezentacja</a:t>
             </a:r>
           </a:p>
           <a:p>
@@ -4003,69 +3996,41 @@
           </a:p>
           <a:p>
             <a:r>
+              <a:rPr lang="pl-PL" sz="2000" dirty="0" smtClean="0"/>
+              <a:t>Zagadnienia, etykiety </a:t>
+            </a:r>
+            <a:r>
               <a:rPr lang="pl-PL" sz="2000" dirty="0"/>
-              <a:t>Wszystko w jednym </a:t>
+              <a:t>i wszystkie metadane, które się z nimi </a:t>
             </a:r>
             <a:r>
               <a:rPr lang="pl-PL" sz="2000" dirty="0" smtClean="0"/>
-              <a:t>miejscu</a:t>
-            </a:r>
-          </a:p>
-          <a:p>
-            <a:endParaRPr lang="pl-PL" sz="2000" dirty="0" smtClean="0"/>
+              <a:t>wiążą</a:t>
+            </a:r>
+          </a:p>
+          <a:p>
+            <a:endParaRPr lang="pl-PL" sz="2000" dirty="0"/>
           </a:p>
           <a:p>
             <a:r>
               <a:rPr lang="pl-PL" sz="2000" dirty="0" smtClean="0"/>
-              <a:t>Analiza problemów </a:t>
+              <a:t>Te </a:t>
             </a:r>
             <a:r>
               <a:rPr lang="pl-PL" sz="2000" dirty="0"/>
-              <a:t>i </a:t>
+              <a:t>same narzędzia </a:t>
             </a:r>
             <a:r>
               <a:rPr lang="pl-PL" sz="2000" dirty="0" smtClean="0"/>
-              <a:t>postępów </a:t>
+              <a:t>GitLab do </a:t>
             </a:r>
             <a:r>
               <a:rPr lang="pl-PL" sz="2000" dirty="0"/>
-              <a:t>bez przełączania się między </a:t>
+              <a:t>sortowania i </a:t>
             </a:r>
             <a:r>
               <a:rPr lang="pl-PL" sz="2000" dirty="0" smtClean="0"/>
-              <a:t>produktami</a:t>
-            </a:r>
-          </a:p>
-          <a:p>
-            <a:endParaRPr lang="pl-PL" sz="2000" dirty="0" smtClean="0"/>
-          </a:p>
-          <a:p>
-            <a:r>
-              <a:rPr lang="pl-PL" sz="2000" dirty="0" smtClean="0"/>
-              <a:t>Jeden </a:t>
-            </a:r>
-            <a:r>
-              <a:rPr lang="pl-PL" sz="2000" dirty="0"/>
-              <a:t>interfejs do śledzenia </a:t>
-            </a:r>
-            <a:r>
-              <a:rPr lang="pl-PL" sz="2000" dirty="0" smtClean="0"/>
-              <a:t>wszystkich zgłoszeń </a:t>
-            </a:r>
-            <a:br>
-              <a:rPr lang="pl-PL" sz="2000" dirty="0" smtClean="0"/>
-            </a:br>
-            <a:r>
-              <a:rPr lang="pl-PL" sz="2000" dirty="0" smtClean="0"/>
-              <a:t>(od </a:t>
-            </a:r>
-            <a:r>
-              <a:rPr lang="pl-PL" sz="2000" dirty="0"/>
-              <a:t>zaległości do </a:t>
-            </a:r>
-            <a:r>
-              <a:rPr lang="pl-PL" sz="2000" dirty="0" smtClean="0"/>
-              <a:t>wykonania)</a:t>
+              <a:t>filtrowania</a:t>
             </a:r>
             <a:endParaRPr lang="pl-PL" sz="2000" dirty="0"/>
           </a:p>
@@ -4074,7 +4039,7 @@
     </p:spTree>
     <p:extLst>
       <p:ext uri="{BB962C8B-B14F-4D97-AF65-F5344CB8AC3E}">
-        <p14:creationId xmlns:p14="http://schemas.microsoft.com/office/powerpoint/2010/main" val="4058966072"/>
+        <p14:creationId xmlns:p14="http://schemas.microsoft.com/office/powerpoint/2010/main" val="4249108325"/>
       </p:ext>
     </p:extLst>
   </p:cSld>
@@ -4134,12 +4099,8 @@
               <a:buNone/>
             </a:pPr>
             <a:r>
-              <a:rPr lang="pl-PL" sz="2400" b="1" dirty="0" err="1" smtClean="0"/>
-              <a:t>Issue</a:t>
-            </a:r>
-            <a:r>
               <a:rPr lang="pl-PL" sz="2400" b="1" dirty="0" smtClean="0"/>
-              <a:t> Board w praktyce</a:t>
+              <a:t>Issue Board w praktyce</a:t>
             </a:r>
             <a:endParaRPr lang="pl-PL" sz="1600" b="1" dirty="0"/>
           </a:p>
@@ -4153,58 +4114,75 @@
           </a:p>
           <a:p>
             <a:r>
+              <a:rPr lang="pl-PL" sz="2000" dirty="0"/>
+              <a:t>Ty określasz swój </a:t>
+            </a:r>
+            <a:r>
               <a:rPr lang="pl-PL" sz="2000" dirty="0" smtClean="0"/>
-              <a:t>Więcej </a:t>
+              <a:t>proces</a:t>
+            </a:r>
+          </a:p>
+          <a:p>
+            <a:r>
+              <a:rPr lang="pl-PL" sz="2000" dirty="0" smtClean="0"/>
+              <a:t>A organizacja spoczywa na GitLab</a:t>
+            </a:r>
+          </a:p>
+          <a:p>
+            <a:r>
+              <a:rPr lang="pl-PL" sz="2000" dirty="0" smtClean="0"/>
+              <a:t>Ty </a:t>
             </a:r>
             <a:r>
               <a:rPr lang="pl-PL" sz="2000" dirty="0"/>
-              <a:t>niż wizualna </a:t>
+              <a:t>tworzysz </a:t>
             </a:r>
             <a:r>
               <a:rPr lang="pl-PL" sz="2000" dirty="0" smtClean="0"/>
-              <a:t>reprezentacja</a:t>
-            </a:r>
-          </a:p>
-          <a:p>
-            <a:endParaRPr lang="pl-PL" sz="2000" dirty="0" smtClean="0"/>
+              <a:t>etykietę</a:t>
+            </a:r>
           </a:p>
           <a:p>
             <a:r>
               <a:rPr lang="pl-PL" sz="2000" dirty="0" smtClean="0"/>
-              <a:t>Zagadnienia, etykiety </a:t>
+              <a:t>GitLab tworzy </a:t>
             </a:r>
             <a:r>
               <a:rPr lang="pl-PL" sz="2000" dirty="0"/>
-              <a:t>i wszystkie metadane, które się z nimi </a:t>
+              <a:t>odpowiednią </a:t>
             </a:r>
             <a:r>
               <a:rPr lang="pl-PL" sz="2000" dirty="0" smtClean="0"/>
-              <a:t>wiążą</a:t>
-            </a:r>
-          </a:p>
-          <a:p>
-            <a:endParaRPr lang="pl-PL" sz="2000" dirty="0"/>
+              <a:t>kartę i wiąże z nią zgłoszenia</a:t>
+            </a:r>
           </a:p>
           <a:p>
             <a:r>
               <a:rPr lang="pl-PL" sz="2000" dirty="0" smtClean="0"/>
-              <a:t>Te </a:t>
+              <a:t>Operacja przeciągania – </a:t>
+            </a:r>
+            <a:r>
+              <a:rPr lang="pl-PL" sz="2000" b="1" dirty="0" smtClean="0"/>
+              <a:t>drag &amp; drop</a:t>
+            </a:r>
+            <a:r>
+              <a:rPr lang="pl-PL" sz="2000" dirty="0" smtClean="0"/>
+              <a:t/>
+            </a:r>
+            <a:br>
+              <a:rPr lang="pl-PL" sz="2000" dirty="0" smtClean="0"/>
+            </a:br>
+            <a:r>
+              <a:rPr lang="pl-PL" sz="2000" dirty="0" smtClean="0"/>
+              <a:t>w prosty sposób pozwala przejść z </a:t>
             </a:r>
             <a:r>
               <a:rPr lang="pl-PL" sz="2000" dirty="0"/>
-              <a:t>same narzędzia </a:t>
+              <a:t>jednego kroku do </a:t>
             </a:r>
             <a:r>
               <a:rPr lang="pl-PL" sz="2000" dirty="0" smtClean="0"/>
-              <a:t>GitLab do </a:t>
-            </a:r>
-            <a:r>
-              <a:rPr lang="pl-PL" sz="2000" dirty="0"/>
-              <a:t>sortowania i </a:t>
-            </a:r>
-            <a:r>
-              <a:rPr lang="pl-PL" sz="2000" dirty="0" smtClean="0"/>
-              <a:t>filtrowania</a:t>
+              <a:t>następnego</a:t>
             </a:r>
             <a:endParaRPr lang="pl-PL" sz="2000" dirty="0"/>
           </a:p>
@@ -4213,7 +4191,7 @@
     </p:spTree>
     <p:extLst>
       <p:ext uri="{BB962C8B-B14F-4D97-AF65-F5344CB8AC3E}">
-        <p14:creationId xmlns:p14="http://schemas.microsoft.com/office/powerpoint/2010/main" val="4249108325"/>
+        <p14:creationId xmlns:p14="http://schemas.microsoft.com/office/powerpoint/2010/main" val="2742567098"/>
       </p:ext>
     </p:extLst>
   </p:cSld>
@@ -4265,7 +4243,7 @@
         </p:spPr>
         <p:txBody>
           <a:bodyPr>
-            <a:normAutofit/>
+            <a:normAutofit fontScale="85000" lnSpcReduction="20000"/>
           </a:bodyPr>
           <a:lstStyle/>
           <a:p>
@@ -4273,108 +4251,110 @@
               <a:buNone/>
             </a:pPr>
             <a:r>
-              <a:rPr lang="pl-PL" sz="2400" b="1" dirty="0" err="1" smtClean="0"/>
-              <a:t>Issue</a:t>
-            </a:r>
-            <a:r>
               <a:rPr lang="pl-PL" sz="2400" b="1" dirty="0" smtClean="0"/>
-              <a:t> Board w praktyce</a:t>
-            </a:r>
+              <a:t>Issue Board w praktyce</a:t>
+            </a:r>
+          </a:p>
+          <a:p>
+            <a:pPr marL="0" indent="0">
+              <a:buNone/>
+            </a:pPr>
             <a:endParaRPr lang="pl-PL" sz="1600" b="1" dirty="0"/>
           </a:p>
           <a:p>
-            <a:pPr marL="0" indent="0">
-              <a:buNone/>
-            </a:pPr>
-            <a:endParaRPr lang="pl-PL" sz="1600" b="1" dirty="0" smtClean="0">
+            <a:r>
+              <a:rPr lang="pl-PL" sz="1900" b="1" dirty="0" smtClean="0"/>
+              <a:t>Utwórz zgłoszenie</a:t>
+            </a:r>
+          </a:p>
+          <a:p>
+            <a:pPr marL="0" indent="0">
+              <a:buNone/>
+            </a:pPr>
+            <a:r>
+              <a:rPr lang="pl-PL" sz="1900" dirty="0" smtClean="0"/>
+              <a:t>Zgłoszenia pozwalają zbierać pomysły i dostosowywać role w zespole w celu osiągniecia wspólnego celu</a:t>
+            </a:r>
+          </a:p>
+          <a:p>
+            <a:pPr marL="0" indent="0">
+              <a:buNone/>
+            </a:pPr>
+            <a:endParaRPr lang="pl-PL" sz="1900" dirty="0" smtClean="0"/>
+          </a:p>
+          <a:p>
+            <a:r>
+              <a:rPr lang="pl-PL" sz="1900" b="1" dirty="0" smtClean="0"/>
+              <a:t>Przydziel etykietę do zgłoszenia</a:t>
+            </a:r>
+          </a:p>
+          <a:p>
+            <a:pPr marL="0" indent="0">
+              <a:buNone/>
+            </a:pPr>
+            <a:r>
+              <a:rPr lang="pl-PL" sz="1900" dirty="0"/>
+              <a:t>Etykiety ułatwiają kategoryzowanie problemów na podstawie opisowych tytułów. Pomagają zespołom szybko zrozumieć kontekst problemu. M</a:t>
+            </a:r>
+            <a:r>
+              <a:rPr lang="pl-PL" sz="1900" dirty="0" smtClean="0"/>
+              <a:t>ogą </a:t>
+            </a:r>
+            <a:r>
+              <a:rPr lang="pl-PL" sz="1900" dirty="0"/>
+              <a:t>służyć do opisywania typu problemu, np. „Nowa funkcja”, lub do opisywania etapu problemu, na przykład „Kontrola jakości”. </a:t>
+            </a:r>
+            <a:endParaRPr lang="pl-PL" sz="1900" dirty="0" smtClean="0"/>
+          </a:p>
+          <a:p>
+            <a:pPr marL="0" indent="0">
+              <a:buNone/>
+            </a:pPr>
+            <a:endParaRPr lang="pl-PL" sz="1900" dirty="0" smtClean="0"/>
+          </a:p>
+          <a:p>
+            <a:r>
+              <a:rPr lang="pl-PL" sz="1900" b="1" dirty="0"/>
+              <a:t>Przejdź do tablicy </a:t>
+            </a:r>
+            <a:r>
+              <a:rPr lang="pl-PL" sz="1900" b="1" dirty="0" smtClean="0"/>
+              <a:t>zgłosze</a:t>
+            </a:r>
+            <a:r>
+              <a:rPr lang="pl-PL" sz="1900" b="1" dirty="0"/>
+              <a:t>ń</a:t>
+            </a:r>
+            <a:endParaRPr lang="pl-PL" sz="1900" b="1" dirty="0" smtClean="0"/>
+          </a:p>
+          <a:p>
+            <a:pPr marL="0" indent="0">
+              <a:buNone/>
+            </a:pPr>
+            <a:r>
+              <a:rPr lang="pl-PL" sz="1900" dirty="0" smtClean="0"/>
+              <a:t>Zgłoszenia pojawiają </a:t>
+            </a:r>
+            <a:r>
+              <a:rPr lang="pl-PL" sz="1900" dirty="0"/>
+              <a:t>się jako karty na tablicy emisyjnej. Można je uporządkować w wielu kolumnach za pomocą list. </a:t>
+            </a:r>
+            <a:endParaRPr lang="en-US" sz="1900" dirty="0"/>
+          </a:p>
+          <a:p>
+            <a:pPr marL="0" indent="0">
+              <a:buNone/>
+            </a:pPr>
+            <a:endParaRPr lang="pl-PL" sz="1900" b="1" dirty="0" smtClean="0">
               <a:latin typeface="+mj-lt"/>
             </a:endParaRPr>
-          </a:p>
-          <a:p>
-            <a:r>
-              <a:rPr lang="pl-PL" sz="2000" dirty="0"/>
-              <a:t>Ty określasz swój </a:t>
-            </a:r>
-            <a:r>
-              <a:rPr lang="pl-PL" sz="2000" dirty="0" smtClean="0"/>
-              <a:t>proces</a:t>
-            </a:r>
-          </a:p>
-          <a:p>
-            <a:r>
-              <a:rPr lang="pl-PL" sz="2000" dirty="0" smtClean="0"/>
-              <a:t>A organizacja spoczywa </a:t>
-            </a:r>
-            <a:r>
-              <a:rPr lang="pl-PL" sz="2000" dirty="0" smtClean="0"/>
-              <a:t>na GitLab</a:t>
-            </a:r>
-            <a:endParaRPr lang="pl-PL" sz="2000" dirty="0" smtClean="0"/>
-          </a:p>
-          <a:p>
-            <a:r>
-              <a:rPr lang="pl-PL" sz="2000" dirty="0" smtClean="0"/>
-              <a:t>Ty </a:t>
-            </a:r>
-            <a:r>
-              <a:rPr lang="pl-PL" sz="2000" dirty="0"/>
-              <a:t>tworzysz </a:t>
-            </a:r>
-            <a:r>
-              <a:rPr lang="pl-PL" sz="2000" dirty="0" smtClean="0"/>
-              <a:t>etykietę</a:t>
-            </a:r>
-          </a:p>
-          <a:p>
-            <a:r>
-              <a:rPr lang="pl-PL" sz="2000" dirty="0" smtClean="0"/>
-              <a:t>GitLab tworzy </a:t>
-            </a:r>
-            <a:r>
-              <a:rPr lang="pl-PL" sz="2000" dirty="0"/>
-              <a:t>odpowiednią </a:t>
-            </a:r>
-            <a:r>
-              <a:rPr lang="pl-PL" sz="2000" dirty="0" smtClean="0"/>
-              <a:t>kartę i wiąże z nią zgłoszenia</a:t>
-            </a:r>
-          </a:p>
-          <a:p>
-            <a:r>
-              <a:rPr lang="pl-PL" sz="2000" dirty="0" smtClean="0"/>
-              <a:t>Operacja przeciągania – </a:t>
-            </a:r>
-            <a:r>
-              <a:rPr lang="pl-PL" sz="2000" b="1" dirty="0" smtClean="0"/>
-              <a:t>drag &amp; drop</a:t>
-            </a:r>
-            <a:r>
-              <a:rPr lang="pl-PL" sz="2000" dirty="0" smtClean="0"/>
-              <a:t/>
-            </a:r>
-            <a:br>
-              <a:rPr lang="pl-PL" sz="2000" dirty="0" smtClean="0"/>
-            </a:br>
-            <a:r>
-              <a:rPr lang="pl-PL" sz="2000" dirty="0" smtClean="0"/>
-              <a:t>w prosty sposób pozwala przejść z </a:t>
-            </a:r>
-            <a:r>
-              <a:rPr lang="pl-PL" sz="2000" dirty="0"/>
-              <a:t>jednego kroku do </a:t>
-            </a:r>
-            <a:r>
-              <a:rPr lang="pl-PL" sz="2000" dirty="0" smtClean="0"/>
-              <a:t>następnego</a:t>
-            </a:r>
-            <a:endParaRPr lang="pl-PL" sz="2000" dirty="0"/>
           </a:p>
         </p:txBody>
       </p:sp>
     </p:spTree>
     <p:extLst>
       <p:ext uri="{BB962C8B-B14F-4D97-AF65-F5344CB8AC3E}">
-        <p14:creationId xmlns:p14="http://schemas.microsoft.com/office/powerpoint/2010/main" val="2742567098"/>
+        <p14:creationId xmlns:p14="http://schemas.microsoft.com/office/powerpoint/2010/main" val="3578570115"/>
       </p:ext>
     </p:extLst>
   </p:cSld>
@@ -4426,7 +4406,7 @@
         </p:spPr>
         <p:txBody>
           <a:bodyPr>
-            <a:normAutofit fontScale="85000" lnSpcReduction="20000"/>
+            <a:normAutofit/>
           </a:bodyPr>
           <a:lstStyle/>
           <a:p>
@@ -4434,113 +4414,78 @@
               <a:buNone/>
             </a:pPr>
             <a:r>
-              <a:rPr lang="pl-PL" sz="2400" b="1" dirty="0" err="1" smtClean="0"/>
-              <a:t>Issue</a:t>
-            </a:r>
-            <a:r>
               <a:rPr lang="pl-PL" sz="2400" b="1" dirty="0" smtClean="0"/>
-              <a:t> Board w </a:t>
-            </a:r>
-            <a:r>
-              <a:rPr lang="pl-PL" sz="2400" b="1" dirty="0" smtClean="0"/>
-              <a:t>praktyce</a:t>
-            </a:r>
-          </a:p>
-          <a:p>
-            <a:pPr marL="0" indent="0">
-              <a:buNone/>
-            </a:pPr>
+              <a:t>Issue Board w praktyce</a:t>
+            </a:r>
             <a:endParaRPr lang="pl-PL" sz="1600" b="1" dirty="0"/>
           </a:p>
           <a:p>
             <a:r>
-              <a:rPr lang="pl-PL" sz="1900" b="1" dirty="0" smtClean="0"/>
-              <a:t>Utwórz zgłoszenie</a:t>
-            </a:r>
-          </a:p>
-          <a:p>
-            <a:pPr marL="0" indent="0">
-              <a:buNone/>
-            </a:pPr>
-            <a:r>
-              <a:rPr lang="pl-PL" sz="1900" dirty="0" smtClean="0"/>
-              <a:t>Zgłoszenia pozwalają zbierać pomysły i dostosowywać role w zespole w celu osiągniecia wspólnego celu</a:t>
-            </a:r>
-          </a:p>
-          <a:p>
-            <a:pPr marL="0" indent="0">
-              <a:buNone/>
-            </a:pPr>
-            <a:endParaRPr lang="pl-PL" sz="1900" dirty="0" smtClean="0"/>
-          </a:p>
-          <a:p>
-            <a:r>
-              <a:rPr lang="pl-PL" sz="1900" b="1" dirty="0" smtClean="0"/>
-              <a:t>Przydziel etykietę do zgłoszenia</a:t>
-            </a:r>
-          </a:p>
-          <a:p>
-            <a:pPr marL="0" indent="0">
-              <a:buNone/>
-            </a:pPr>
-            <a:r>
-              <a:rPr lang="pl-PL" sz="1900" dirty="0"/>
-              <a:t>Etykiety ułatwiają kategoryzowanie problemów na podstawie opisowych tytułów. Pomagają zespołom szybko zrozumieć kontekst problemu. </a:t>
-            </a:r>
-            <a:r>
-              <a:rPr lang="pl-PL" sz="1900" dirty="0"/>
-              <a:t>M</a:t>
-            </a:r>
-            <a:r>
-              <a:rPr lang="pl-PL" sz="1900" dirty="0" smtClean="0"/>
-              <a:t>ogą </a:t>
-            </a:r>
-            <a:r>
-              <a:rPr lang="pl-PL" sz="1900" dirty="0"/>
-              <a:t>służyć do opisywania typu problemu, np. „Nowa funkcja”, lub do opisywania etapu problemu, na przykład „Kontrola jakości”. </a:t>
-            </a:r>
-            <a:endParaRPr lang="pl-PL" sz="1900" dirty="0" smtClean="0"/>
-          </a:p>
-          <a:p>
-            <a:pPr marL="0" indent="0">
-              <a:buNone/>
-            </a:pPr>
-            <a:endParaRPr lang="pl-PL" sz="1900" dirty="0" smtClean="0"/>
-          </a:p>
-          <a:p>
-            <a:r>
-              <a:rPr lang="pl-PL" sz="1900" b="1" dirty="0"/>
-              <a:t>Przejdź do tablicy </a:t>
-            </a:r>
-            <a:r>
-              <a:rPr lang="pl-PL" sz="1900" b="1" dirty="0" smtClean="0"/>
-              <a:t>zgłosze</a:t>
-            </a:r>
-            <a:r>
-              <a:rPr lang="pl-PL" sz="1900" b="1" dirty="0"/>
-              <a:t>ń</a:t>
-            </a:r>
-            <a:endParaRPr lang="pl-PL" sz="1900" b="1" dirty="0" smtClean="0"/>
-          </a:p>
-          <a:p>
-            <a:pPr marL="0" indent="0">
-              <a:buNone/>
-            </a:pPr>
-            <a:r>
-              <a:rPr lang="pl-PL" sz="1900" dirty="0" smtClean="0"/>
-              <a:t>Zgłoszenia pojawiają </a:t>
-            </a:r>
-            <a:r>
-              <a:rPr lang="pl-PL" sz="1900" dirty="0"/>
-              <a:t>się jako karty na tablicy emisyjnej. Można je uporządkować w wielu kolumnach za pomocą list. </a:t>
-            </a:r>
-            <a:endParaRPr lang="en-US" sz="1900" dirty="0"/>
-          </a:p>
-          <a:p>
-            <a:pPr marL="0" indent="0">
-              <a:buNone/>
-            </a:pPr>
-            <a:endParaRPr lang="pl-PL" sz="1900" b="1" dirty="0" smtClean="0">
+              <a:rPr lang="pl-PL" sz="1800" b="1" dirty="0"/>
+              <a:t>Utwórz nową </a:t>
+            </a:r>
+            <a:r>
+              <a:rPr lang="pl-PL" sz="1800" b="1" dirty="0" smtClean="0"/>
+              <a:t>listę</a:t>
+            </a:r>
+          </a:p>
+          <a:p>
+            <a:pPr marL="0" indent="0">
+              <a:buNone/>
+            </a:pPr>
+            <a:r>
+              <a:rPr lang="pl-PL" sz="1800" dirty="0" smtClean="0"/>
+              <a:t>Listy </a:t>
+            </a:r>
+            <a:r>
+              <a:rPr lang="pl-PL" sz="1800" dirty="0"/>
+              <a:t>są oparte na etykietach już utworzonych dla Twojego projektu. </a:t>
+            </a:r>
+            <a:endParaRPr lang="pl-PL" sz="1800" dirty="0" smtClean="0"/>
+          </a:p>
+          <a:p>
+            <a:pPr marL="0" indent="0">
+              <a:buNone/>
+            </a:pPr>
+            <a:r>
+              <a:rPr lang="pl-PL" sz="1800" dirty="0" smtClean="0"/>
+              <a:t>Każda </a:t>
+            </a:r>
+            <a:r>
+              <a:rPr lang="pl-PL" sz="1800" dirty="0"/>
+              <a:t>lista zawiera sprawy przypisane do odpowiedniej </a:t>
+            </a:r>
+            <a:r>
+              <a:rPr lang="pl-PL" sz="1800" dirty="0" smtClean="0"/>
+              <a:t>etykiety</a:t>
+            </a:r>
+            <a:r>
+              <a:rPr lang="pl-PL" sz="1800" dirty="0"/>
+              <a:t>. </a:t>
+            </a:r>
+            <a:endParaRPr lang="pl-PL" sz="1800" dirty="0" smtClean="0"/>
+          </a:p>
+          <a:p>
+            <a:pPr marL="0" indent="0">
+              <a:buNone/>
+            </a:pPr>
+            <a:endParaRPr lang="pl-PL" sz="1800" dirty="0" smtClean="0"/>
+          </a:p>
+          <a:p>
+            <a:r>
+              <a:rPr lang="pl-PL" sz="1800" b="1" dirty="0" smtClean="0"/>
+              <a:t>Przenoś zgłoszenia pomiędzy listami</a:t>
+            </a:r>
+          </a:p>
+          <a:p>
+            <a:pPr marL="0" indent="0">
+              <a:buNone/>
+            </a:pPr>
+            <a:r>
+              <a:rPr lang="pl-PL" sz="1800" dirty="0" smtClean="0"/>
+              <a:t>Wykorzystując system zgłoszeń i list możesz w łatwy sposób śledzić postępy w realizacji projektu oraz łatwo dostosowywać swoje plany, bezpośrednio na podstawie tablicy zgłoszeń.</a:t>
+            </a:r>
+            <a:endParaRPr lang="pl-PL" sz="1800" b="1" dirty="0" smtClean="0">
               <a:latin typeface="+mj-lt"/>
             </a:endParaRPr>
           </a:p>
@@ -4549,7 +4494,7 @@
     </p:spTree>
     <p:extLst>
       <p:ext uri="{BB962C8B-B14F-4D97-AF65-F5344CB8AC3E}">
-        <p14:creationId xmlns:p14="http://schemas.microsoft.com/office/powerpoint/2010/main" val="3578570115"/>
+        <p14:creationId xmlns:p14="http://schemas.microsoft.com/office/powerpoint/2010/main" val="734856888"/>
       </p:ext>
     </p:extLst>
   </p:cSld>
@@ -4609,156 +4554,8 @@
               <a:buNone/>
             </a:pPr>
             <a:r>
-              <a:rPr lang="pl-PL" sz="2400" b="1" dirty="0" err="1" smtClean="0"/>
-              <a:t>Issue</a:t>
-            </a:r>
-            <a:r>
-              <a:rPr lang="pl-PL" sz="2400" b="1" dirty="0" smtClean="0"/>
-              <a:t> Board w praktyce</a:t>
-            </a:r>
-            <a:endParaRPr lang="pl-PL" sz="1600" b="1" dirty="0"/>
-          </a:p>
-          <a:p>
-            <a:r>
-              <a:rPr lang="pl-PL" sz="1800" b="1" dirty="0"/>
-              <a:t>Utwórz nową </a:t>
-            </a:r>
-            <a:r>
-              <a:rPr lang="pl-PL" sz="1800" b="1" dirty="0" smtClean="0"/>
-              <a:t>listę</a:t>
-            </a:r>
-          </a:p>
-          <a:p>
-            <a:pPr marL="0" indent="0">
-              <a:buNone/>
-            </a:pPr>
-            <a:r>
-              <a:rPr lang="pl-PL" sz="1800" dirty="0" smtClean="0"/>
-              <a:t>Listy </a:t>
-            </a:r>
-            <a:r>
-              <a:rPr lang="pl-PL" sz="1800" dirty="0"/>
-              <a:t>są oparte na etykietach już utworzonych dla Twojego projektu. </a:t>
-            </a:r>
-            <a:endParaRPr lang="pl-PL" sz="1800" dirty="0" smtClean="0"/>
-          </a:p>
-          <a:p>
-            <a:pPr marL="0" indent="0">
-              <a:buNone/>
-            </a:pPr>
-            <a:r>
-              <a:rPr lang="pl-PL" sz="1800" dirty="0" smtClean="0"/>
-              <a:t>Każda </a:t>
-            </a:r>
-            <a:r>
-              <a:rPr lang="pl-PL" sz="1800" dirty="0"/>
-              <a:t>lista zawiera sprawy przypisane do odpowiedniej </a:t>
-            </a:r>
-            <a:r>
-              <a:rPr lang="pl-PL" sz="1800" dirty="0" smtClean="0"/>
-              <a:t>etykiety</a:t>
-            </a:r>
-            <a:r>
-              <a:rPr lang="pl-PL" sz="1800" dirty="0"/>
-              <a:t>. </a:t>
-            </a:r>
-            <a:endParaRPr lang="pl-PL" sz="1800" dirty="0" smtClean="0"/>
-          </a:p>
-          <a:p>
-            <a:pPr marL="0" indent="0">
-              <a:buNone/>
-            </a:pPr>
-            <a:endParaRPr lang="pl-PL" sz="1800" dirty="0" smtClean="0"/>
-          </a:p>
-          <a:p>
-            <a:r>
-              <a:rPr lang="pl-PL" sz="1800" b="1" dirty="0" smtClean="0"/>
-              <a:t>Przenoś zgłoszenia pomiędzy listami</a:t>
-            </a:r>
-          </a:p>
-          <a:p>
-            <a:pPr marL="0" indent="0">
-              <a:buNone/>
-            </a:pPr>
-            <a:r>
-              <a:rPr lang="pl-PL" sz="1800" dirty="0" smtClean="0"/>
-              <a:t>Wykorzystując system zgłoszeń i list możesz w łatwy sposób śledzić postępy w realizacji projektu oraz łatwo dostosowywać swoje plany, bezpośrednio na podstawie tablicy zgłoszeń.</a:t>
-            </a:r>
-            <a:endParaRPr lang="pl-PL" sz="1800" b="1" dirty="0" smtClean="0">
-              <a:latin typeface="+mj-lt"/>
-            </a:endParaRPr>
-          </a:p>
-        </p:txBody>
-      </p:sp>
-    </p:spTree>
-    <p:extLst>
-      <p:ext uri="{BB962C8B-B14F-4D97-AF65-F5344CB8AC3E}">
-        <p14:creationId xmlns:p14="http://schemas.microsoft.com/office/powerpoint/2010/main" val="734856888"/>
-      </p:ext>
-    </p:extLst>
-  </p:cSld>
-  <p:clrMapOvr>
-    <a:masterClrMapping/>
-  </p:clrMapOvr>
-  <p:timing>
-    <p:tnLst>
-      <p:par>
-        <p:cTn id="1" dur="indefinite" restart="never" nodeType="tmRoot"/>
-      </p:par>
-    </p:tnLst>
-  </p:timing>
-</p:sld>
-</file>
-
-<file path=ppt/slides/slide17.xml><?xml version="1.0" encoding="utf-8"?>
-<p:sld xmlns:a="http://schemas.openxmlformats.org/drawingml/2006/main" xmlns:r="http://schemas.openxmlformats.org/officeDocument/2006/relationships" xmlns:p="http://schemas.openxmlformats.org/presentationml/2006/main">
-  <p:cSld>
-    <p:spTree>
-      <p:nvGrpSpPr>
-        <p:cNvPr id="1" name=""/>
-        <p:cNvGrpSpPr/>
-        <p:nvPr/>
-      </p:nvGrpSpPr>
-      <p:grpSpPr>
-        <a:xfrm>
-          <a:off x="0" y="0"/>
-          <a:ext cx="0" cy="0"/>
-          <a:chOff x="0" y="0"/>
-          <a:chExt cx="0" cy="0"/>
-        </a:xfrm>
-      </p:grpSpPr>
-      <p:sp>
-        <p:nvSpPr>
-          <p:cNvPr id="3" name="Symbol zastępczy zawartości 2"/>
-          <p:cNvSpPr>
-            <a:spLocks noGrp="1"/>
-          </p:cNvSpPr>
-          <p:nvPr>
-            <p:ph idx="1"/>
-          </p:nvPr>
-        </p:nvSpPr>
-        <p:spPr>
-          <a:xfrm>
-            <a:off x="457200" y="987574"/>
-            <a:ext cx="8229600" cy="3607048"/>
-          </a:xfrm>
-        </p:spPr>
-        <p:txBody>
-          <a:bodyPr>
-            <a:normAutofit/>
-          </a:bodyPr>
-          <a:lstStyle/>
-          <a:p>
-            <a:pPr marL="0" indent="0">
-              <a:buNone/>
-            </a:pPr>
-            <a:r>
-              <a:rPr lang="pl-PL" sz="2400" b="1" dirty="0" err="1"/>
-              <a:t>Issue</a:t>
-            </a:r>
-            <a:r>
               <a:rPr lang="pl-PL" sz="2400" b="1" dirty="0"/>
-              <a:t> </a:t>
+              <a:t>Issue </a:t>
             </a:r>
             <a:r>
               <a:rPr lang="pl-PL" sz="2400" b="1" dirty="0" smtClean="0"/>
@@ -4943,7 +4740,7 @@
               <a:buNone/>
             </a:pPr>
             <a:r>
-              <a:rPr lang="pl-PL" sz="2400" b="1" dirty="0" err="1" smtClean="0">
+              <a:rPr lang="en-US" sz="2400" b="1" dirty="0" smtClean="0">
                 <a:latin typeface="+mj-lt"/>
               </a:rPr>
               <a:t>Issue</a:t>
@@ -4952,7 +4749,13 @@
               <a:rPr lang="pl-PL" sz="2400" b="1" dirty="0" smtClean="0">
                 <a:latin typeface="+mj-lt"/>
               </a:rPr>
-              <a:t> Board</a:t>
+              <a:t> </a:t>
+            </a:r>
+            <a:r>
+              <a:rPr lang="pl-PL" sz="2400" b="1" dirty="0" smtClean="0">
+                <a:latin typeface="+mj-lt"/>
+              </a:rPr>
+              <a:t>Board</a:t>
             </a:r>
             <a:endParaRPr lang="pl-PL" sz="1600" b="1" dirty="0" smtClean="0">
               <a:latin typeface="+mj-lt"/>
@@ -5187,16 +4990,10 @@
               <a:buNone/>
             </a:pPr>
             <a:r>
-              <a:rPr lang="pl-PL" sz="2400" b="1" dirty="0" err="1" smtClean="0">
-                <a:latin typeface="+mj-lt"/>
-              </a:rPr>
-              <a:t>Issue</a:t>
-            </a:r>
-            <a:r>
               <a:rPr lang="pl-PL" sz="2400" b="1" dirty="0" smtClean="0">
                 <a:latin typeface="+mj-lt"/>
               </a:rPr>
-              <a:t> Board</a:t>
+              <a:t>Issue Board</a:t>
             </a:r>
             <a:endParaRPr lang="pl-PL" sz="1600" b="1" dirty="0" smtClean="0">
               <a:latin typeface="+mj-lt"/>
@@ -5228,23 +5025,11 @@
               <a:t>	</a:t>
             </a:r>
             <a:r>
-              <a:rPr lang="pl-PL" sz="1600" b="1" dirty="0" err="1" smtClean="0"/>
-              <a:t>Issues</a:t>
-            </a:r>
-            <a:r>
-              <a:rPr lang="pl-PL" sz="1600" b="1" dirty="0" smtClean="0"/>
-              <a:t> </a:t>
-            </a:r>
-            <a:r>
-              <a:rPr lang="pl-PL" sz="1600" b="1" dirty="0"/>
-              <a:t>-&gt; New </a:t>
-            </a:r>
-            <a:r>
-              <a:rPr lang="pl-PL" sz="1600" b="1" dirty="0" err="1"/>
-              <a:t>issue</a:t>
-            </a:r>
-            <a:r>
-              <a:rPr lang="pl-PL" sz="1600" dirty="0"/>
+              <a:rPr lang="en-US" sz="1600" b="1" dirty="0" smtClean="0"/>
+              <a:t>Issues -&gt; New issue</a:t>
+            </a:r>
+            <a:r>
+              <a:rPr lang="pl-PL" sz="1600" dirty="0" smtClean="0"/>
               <a:t>, </a:t>
             </a:r>
             <a:r>
@@ -5270,27 +5055,23 @@
             </a:r>
             <a:r>
               <a:rPr lang="pl-PL" sz="1600" dirty="0" smtClean="0"/>
-              <a:t> (</a:t>
-            </a:r>
-            <a:r>
-              <a:rPr lang="pl-PL" sz="1600" b="1" dirty="0" err="1" smtClean="0"/>
-              <a:t>Issue</a:t>
-            </a:r>
-            <a:r>
-              <a:rPr lang="pl-PL" sz="1600" b="1" dirty="0" smtClean="0"/>
               <a:t> </a:t>
             </a:r>
             <a:r>
-              <a:rPr lang="pl-PL" sz="1600" b="1" dirty="0" err="1"/>
-              <a:t>T</a:t>
-            </a:r>
-            <a:r>
-              <a:rPr lang="pl-PL" sz="1600" b="1" dirty="0" err="1" smtClean="0"/>
-              <a:t>racker</a:t>
-            </a:r>
-            <a:r>
               <a:rPr lang="pl-PL" sz="1600" dirty="0" smtClean="0"/>
-              <a:t>) zapewnia </a:t>
+              <a:t>(</a:t>
+            </a:r>
+            <a:r>
+              <a:rPr lang="en-US" sz="1600" b="1" dirty="0" smtClean="0"/>
+              <a:t>Issue Tracker</a:t>
+            </a:r>
+            <a:r>
+              <a:rPr lang="pl-PL" sz="1600" dirty="0" smtClean="0"/>
+              <a:t>) </a:t>
+            </a:r>
+            <a:r>
+              <a:rPr lang="pl-PL" sz="1600" dirty="0" smtClean="0"/>
+              <a:t>zapewnia </a:t>
             </a:r>
             <a:r>
               <a:rPr lang="pl-PL" sz="1600" dirty="0"/>
@@ -5376,12 +5157,8 @@
               <a:buNone/>
             </a:pPr>
             <a:r>
-              <a:rPr lang="pl-PL" sz="2400" b="1" dirty="0" err="1"/>
-              <a:t>Issue</a:t>
-            </a:r>
-            <a:r>
               <a:rPr lang="pl-PL" sz="2400" b="1" dirty="0"/>
-              <a:t> Board</a:t>
+              <a:t>Issue Board</a:t>
             </a:r>
             <a:endParaRPr lang="pl-PL" sz="1600" b="1" dirty="0"/>
           </a:p>
@@ -5549,12 +5326,16 @@
               <a:buNone/>
             </a:pPr>
             <a:r>
-              <a:rPr lang="pl-PL" sz="2400" b="1" dirty="0" err="1"/>
+              <a:rPr lang="en-US" sz="2400" b="1" dirty="0" smtClean="0"/>
               <a:t>Issue</a:t>
             </a:r>
             <a:r>
+              <a:rPr lang="pl-PL" sz="2400" b="1" dirty="0" smtClean="0"/>
+              <a:t> </a:t>
+            </a:r>
+            <a:r>
               <a:rPr lang="pl-PL" sz="2400" b="1" dirty="0"/>
-              <a:t> Board</a:t>
+              <a:t>Board</a:t>
             </a:r>
             <a:endParaRPr lang="pl-PL" sz="1600" b="1" dirty="0"/>
           </a:p>
@@ -5735,12 +5516,16 @@
               <a:buNone/>
             </a:pPr>
             <a:r>
-              <a:rPr lang="pl-PL" sz="2400" b="1" dirty="0" err="1"/>
+              <a:rPr lang="en-US" sz="2400" b="1" dirty="0" smtClean="0"/>
               <a:t>Issue</a:t>
             </a:r>
             <a:r>
+              <a:rPr lang="pl-PL" sz="2400" b="1" dirty="0" smtClean="0"/>
+              <a:t> </a:t>
+            </a:r>
+            <a:r>
               <a:rPr lang="pl-PL" sz="2400" b="1" dirty="0"/>
-              <a:t> Board</a:t>
+              <a:t>Board</a:t>
             </a:r>
             <a:endParaRPr lang="pl-PL" sz="1600" b="1" dirty="0"/>
           </a:p>
@@ -5909,12 +5694,16 @@
               <a:buNone/>
             </a:pPr>
             <a:r>
-              <a:rPr lang="pl-PL" sz="2400" b="1" dirty="0" err="1"/>
+              <a:rPr lang="en-US" sz="2400" b="1" dirty="0" smtClean="0"/>
               <a:t>Issue</a:t>
             </a:r>
             <a:r>
+              <a:rPr lang="pl-PL" sz="2400" b="1" dirty="0" smtClean="0"/>
+              <a:t> </a:t>
+            </a:r>
+            <a:r>
               <a:rPr lang="pl-PL" sz="2400" b="1" dirty="0"/>
-              <a:t> Board</a:t>
+              <a:t>Board</a:t>
             </a:r>
             <a:endParaRPr lang="pl-PL" sz="1600" b="1" dirty="0"/>
           </a:p>
@@ -6087,12 +5876,16 @@
               <a:buNone/>
             </a:pPr>
             <a:r>
-              <a:rPr lang="pl-PL" sz="2400" b="1" dirty="0" err="1"/>
+              <a:rPr lang="en-US" sz="2400" b="1" dirty="0" smtClean="0"/>
               <a:t>Issue</a:t>
             </a:r>
             <a:r>
+              <a:rPr lang="pl-PL" sz="2400" b="1" dirty="0" smtClean="0"/>
+              <a:t> </a:t>
+            </a:r>
+            <a:r>
               <a:rPr lang="pl-PL" sz="2400" b="1" dirty="0"/>
-              <a:t> Board</a:t>
+              <a:t>Board</a:t>
             </a:r>
             <a:endParaRPr lang="pl-PL" sz="1600" b="1" dirty="0"/>
           </a:p>
@@ -6247,12 +6040,16 @@
               <a:buNone/>
             </a:pPr>
             <a:r>
-              <a:rPr lang="pl-PL" sz="2400" b="1" dirty="0" err="1"/>
+              <a:rPr lang="en-US" sz="2400" b="1" dirty="0" smtClean="0"/>
               <a:t>Issue</a:t>
             </a:r>
             <a:r>
+              <a:rPr lang="pl-PL" sz="2400" b="1" dirty="0" smtClean="0"/>
+              <a:t> </a:t>
+            </a:r>
+            <a:r>
               <a:rPr lang="pl-PL" sz="2400" b="1" dirty="0"/>
-              <a:t> Board</a:t>
+              <a:t>Board</a:t>
             </a:r>
             <a:endParaRPr lang="pl-PL" sz="1600" b="1" dirty="0"/>
           </a:p>
@@ -6267,15 +6064,7 @@
           <a:p>
             <a:r>
               <a:rPr lang="pl-PL" sz="1600" dirty="0"/>
-              <a:t>GitLab </a:t>
-            </a:r>
-            <a:r>
-              <a:rPr lang="pl-PL" sz="1600" dirty="0" err="1"/>
-              <a:t>Issue</a:t>
-            </a:r>
-            <a:r>
-              <a:rPr lang="pl-PL" sz="1600" dirty="0"/>
-              <a:t> Board (tablica zgłoszeń) to znakomite narzędzie do planowania i organizowania zgłoszeń, umożliwiające dopasowanie ich do procesów w Twoim projekcie</a:t>
+              <a:t>GitLab Issue Board (tablica zgłoszeń) to znakomite narzędzie do planowania i organizowania zgłoszeń, umożliwiające dopasowanie ich do procesów w Twoim projekcie</a:t>
             </a:r>
             <a:r>
               <a:rPr lang="pl-PL" sz="1600" dirty="0" smtClean="0"/>

</xml_diff>